<commit_message>
Atualizando o arquivo PITCH
</commit_message>
<xml_diff>
--- a/DocumentacaoProjeto/FIAP-QualidProjSW-Aula-4-AdministracaoConteudo- EXERCICIOS.pptx
+++ b/DocumentacaoProjeto/FIAP-QualidProjSW-Aula-4-AdministracaoConteudo- EXERCICIOS.pptx
@@ -127,8 +127,19 @@
         </p15:guide>
       </p15:sldGuideLst>
     </p:ext>
+    <p:ext uri="{2D200454-40CA-4A62-9FC3-DE9A4176ACB9}">
+      <p15:notesGuideLst xmlns:p15="http://schemas.microsoft.com/office/powerpoint/2012/main"/>
+    </p:ext>
   </p:extLst>
 </p:presentation>
+</file>
+
+<file path=ppt/revisionInfo.xml><?xml version="1.0" encoding="utf-8"?>
+<p1510:revInfo xmlns:a="http://schemas.openxmlformats.org/drawingml/2006/main" xmlns:r="http://schemas.openxmlformats.org/officeDocument/2006/relationships" xmlns:p1510="http://schemas.microsoft.com/office/powerpoint/2015/10/main">
+  <p1510:revLst>
+    <p1510:client id="{2C43BA8D-D668-44B8-A7A8-FEB06AD7C1D8}" v="22" dt="2024-03-06T21:01:37.996"/>
+  </p1510:revLst>
+</p1510:revInfo>
 </file>
 
 <file path=ppt/handoutMasters/handoutMaster1.xml><?xml version="1.0" encoding="utf-8"?>
@@ -225,7 +236,7 @@
           <a:p>
             <a:fld id="{F8977565-27DA-4165-A15C-AFF4314E7084}" type="datetimeFigureOut">
               <a:rPr lang="pt-BR" smtClean="0"/>
-              <a:t>27/01/2023</a:t>
+              <a:t>06/03/2024</a:t>
             </a:fld>
             <a:endParaRPr lang="pt-BR"/>
           </a:p>
@@ -402,7 +413,7 @@
           <a:p>
             <a:fld id="{B6D4C934-FEA0-426E-B081-61FE807EA637}" type="datetimeFigureOut">
               <a:rPr lang="pt-BR" smtClean="0"/>
-              <a:t>27/01/2023</a:t>
+              <a:t>06/03/2024</a:t>
             </a:fld>
             <a:endParaRPr lang="pt-BR"/>
           </a:p>
@@ -1244,7 +1255,7 @@
           <a:p>
             <a:fld id="{89C4B140-6DEB-45EB-A5FE-2FE213A19AB6}" type="datetimeFigureOut">
               <a:rPr lang="pt-BR" smtClean="0"/>
-              <a:t>27/01/2023</a:t>
+              <a:t>06/03/2024</a:t>
             </a:fld>
             <a:endParaRPr lang="pt-BR"/>
           </a:p>
@@ -1452,7 +1463,7 @@
           <a:p>
             <a:fld id="{89C4B140-6DEB-45EB-A5FE-2FE213A19AB6}" type="datetimeFigureOut">
               <a:rPr lang="pt-BR" smtClean="0"/>
-              <a:t>27/01/2023</a:t>
+              <a:t>06/03/2024</a:t>
             </a:fld>
             <a:endParaRPr lang="pt-BR"/>
           </a:p>
@@ -1660,7 +1671,7 @@
           <a:p>
             <a:fld id="{89C4B140-6DEB-45EB-A5FE-2FE213A19AB6}" type="datetimeFigureOut">
               <a:rPr lang="pt-BR" smtClean="0"/>
-              <a:t>27/01/2023</a:t>
+              <a:t>06/03/2024</a:t>
             </a:fld>
             <a:endParaRPr lang="pt-BR"/>
           </a:p>
@@ -2066,7 +2077,7 @@
           <a:p>
             <a:fld id="{89C4B140-6DEB-45EB-A5FE-2FE213A19AB6}" type="datetimeFigureOut">
               <a:rPr lang="pt-BR" smtClean="0"/>
-              <a:t>27/01/2023</a:t>
+              <a:t>06/03/2024</a:t>
             </a:fld>
             <a:endParaRPr lang="pt-BR"/>
           </a:p>
@@ -2341,7 +2352,7 @@
           <a:p>
             <a:fld id="{89C4B140-6DEB-45EB-A5FE-2FE213A19AB6}" type="datetimeFigureOut">
               <a:rPr lang="pt-BR" smtClean="0"/>
-              <a:t>27/01/2023</a:t>
+              <a:t>06/03/2024</a:t>
             </a:fld>
             <a:endParaRPr lang="pt-BR"/>
           </a:p>
@@ -2664,7 +2675,7 @@
           <a:p>
             <a:fld id="{89C4B140-6DEB-45EB-A5FE-2FE213A19AB6}" type="datetimeFigureOut">
               <a:rPr lang="pt-BR" smtClean="0"/>
-              <a:t>27/01/2023</a:t>
+              <a:t>06/03/2024</a:t>
             </a:fld>
             <a:endParaRPr lang="pt-BR"/>
           </a:p>
@@ -3127,7 +3138,7 @@
           <a:p>
             <a:fld id="{89C4B140-6DEB-45EB-A5FE-2FE213A19AB6}" type="datetimeFigureOut">
               <a:rPr lang="pt-BR" smtClean="0"/>
-              <a:t>27/01/2023</a:t>
+              <a:t>06/03/2024</a:t>
             </a:fld>
             <a:endParaRPr lang="pt-BR"/>
           </a:p>
@@ -3276,7 +3287,7 @@
           <a:p>
             <a:fld id="{89C4B140-6DEB-45EB-A5FE-2FE213A19AB6}" type="datetimeFigureOut">
               <a:rPr lang="pt-BR" smtClean="0"/>
-              <a:t>27/01/2023</a:t>
+              <a:t>06/03/2024</a:t>
             </a:fld>
             <a:endParaRPr lang="pt-BR"/>
           </a:p>
@@ -3395,7 +3406,7 @@
           <a:p>
             <a:fld id="{89C4B140-6DEB-45EB-A5FE-2FE213A19AB6}" type="datetimeFigureOut">
               <a:rPr lang="pt-BR" smtClean="0"/>
-              <a:t>27/01/2023</a:t>
+              <a:t>06/03/2024</a:t>
             </a:fld>
             <a:endParaRPr lang="pt-BR"/>
           </a:p>
@@ -3703,7 +3714,7 @@
           <a:p>
             <a:fld id="{89C4B140-6DEB-45EB-A5FE-2FE213A19AB6}" type="datetimeFigureOut">
               <a:rPr lang="pt-BR" smtClean="0"/>
-              <a:t>27/01/2023</a:t>
+              <a:t>06/03/2024</a:t>
             </a:fld>
             <a:endParaRPr lang="pt-BR"/>
           </a:p>
@@ -3988,7 +3999,7 @@
           <a:p>
             <a:fld id="{89C4B140-6DEB-45EB-A5FE-2FE213A19AB6}" type="datetimeFigureOut">
               <a:rPr lang="pt-BR" smtClean="0"/>
-              <a:t>27/01/2023</a:t>
+              <a:t>06/03/2024</a:t>
             </a:fld>
             <a:endParaRPr lang="pt-BR"/>
           </a:p>
@@ -4896,6 +4907,54 @@
               <a:t>COMPLIANCE &amp; QUALITY ASSURANCE</a:t>
             </a:r>
             <a:endParaRPr lang="pt-BR" b="1" dirty="0"/>
+          </a:p>
+        </p:txBody>
+      </p:sp>
+      <p:sp>
+        <p:nvSpPr>
+          <p:cNvPr id="2" name="CaixaDeTexto 1">
+            <a:extLst>
+              <a:ext uri="{FF2B5EF4-FFF2-40B4-BE49-F238E27FC236}">
+                <a16:creationId xmlns:a16="http://schemas.microsoft.com/office/drawing/2014/main" id="{3840AC6B-7707-7841-931A-E9116303EA84}"/>
+              </a:ext>
+            </a:extLst>
+          </p:cNvPr>
+          <p:cNvSpPr txBox="1"/>
+          <p:nvPr/>
+        </p:nvSpPr>
+        <p:spPr>
+          <a:xfrm>
+            <a:off x="906162" y="1616675"/>
+            <a:ext cx="2430162" cy="369332"/>
+          </a:xfrm>
+          <a:prstGeom prst="rect">
+            <a:avLst/>
+          </a:prstGeom>
+          <a:noFill/>
+        </p:spPr>
+        <p:txBody>
+          <a:bodyPr rot="0" spcFirstLastPara="0" vertOverflow="overflow" horzOverflow="overflow" vert="horz" wrap="square" lIns="91440" tIns="45720" rIns="91440" bIns="45720" numCol="1" spcCol="0" rtlCol="0" fromWordArt="0" anchor="t" anchorCtr="0" forceAA="0" compatLnSpc="1">
+            <a:prstTxWarp prst="textNoShape">
+              <a:avLst/>
+            </a:prstTxWarp>
+            <a:spAutoFit/>
+          </a:bodyPr>
+          <a:lstStyle/>
+          <a:p>
+            <a:r>
+              <a:rPr lang="pt-BR" dirty="0">
+                <a:highlight>
+                  <a:srgbClr val="FFFF00"/>
+                </a:highlight>
+                <a:cs typeface="Calibri"/>
+              </a:rPr>
+              <a:t>Teste GITHUB</a:t>
+            </a:r>
+            <a:endParaRPr lang="pt-BR" dirty="0">
+              <a:highlight>
+                <a:srgbClr val="FFFF00"/>
+              </a:highlight>
+            </a:endParaRPr>
           </a:p>
         </p:txBody>
       </p:sp>

</xml_diff>